<commit_message>
Add notes to slides
</commit_message>
<xml_diff>
--- a/Slides.pptx
+++ b/Slides.pptx
@@ -723,7 +723,40 @@
           <a:bodyPr/>
           <a:lstStyle/>
           <a:p>
-            <a:endParaRPr lang="en-US" dirty="0"/>
+            <a:r>
+              <a:rPr lang="en-US" dirty="0"/>
+              <a:t>Welcome to </a:t>
+            </a:r>
+            <a:r>
+              <a:rPr lang="en-US" i="1" dirty="0"/>
+              <a:t>LINQ: Getting things you didn’t know you wanted, in ways that you don’t understand!</a:t>
+            </a:r>
+          </a:p>
+          <a:p>
+            <a:endParaRPr lang="en-US" i="1" dirty="0"/>
+          </a:p>
+          <a:p>
+            <a:r>
+              <a:rPr lang="en-US" i="0" dirty="0"/>
+              <a:t>If you don’t know me, I’m Chuck and I work in the Security BU. </a:t>
+            </a:r>
+          </a:p>
+          <a:p>
+            <a:endParaRPr lang="en-US" i="0" dirty="0"/>
+          </a:p>
+          <a:p>
+            <a:r>
+              <a:rPr lang="en-US" i="0" dirty="0"/>
+              <a:t>Today we are going to dive into LINQ, but fair warning, this is not a deep dive into the obscure parts, this is meant as an introductory presentation for those new to </a:t>
+            </a:r>
+            <a:r>
+              <a:rPr lang="en-US" i="0" dirty="0" err="1"/>
+              <a:t>.Net</a:t>
+            </a:r>
+            <a:r>
+              <a:rPr lang="en-US" i="0" dirty="0"/>
+              <a:t>. </a:t>
+            </a:r>
           </a:p>
         </p:txBody>
       </p:sp>
@@ -809,24 +842,116 @@
           <a:p>
             <a:r>
               <a:rPr lang="en-US" dirty="0"/>
-              <a:t>In the olden days…</a:t>
-            </a:r>
-          </a:p>
-          <a:p>
-            <a:r>
-              <a:rPr lang="en-US" dirty="0"/>
-              <a:t>If you wanted to interact with data, how you did varied widely by the type of data</a:t>
-            </a:r>
-          </a:p>
-          <a:p>
-            <a:r>
-              <a:rPr lang="en-US" dirty="0"/>
-              <a:t>Microsoft wanted a unified syntax </a:t>
-            </a:r>
-            <a:r>
-              <a:rPr lang="en-US"/>
-              <a:t>and feature set</a:t>
-            </a:r>
+              <a:t>Here’s an overview of what we are going to cover.</a:t>
+            </a:r>
+          </a:p>
+          <a:p>
+            <a:endParaRPr lang="en-US" dirty="0"/>
+          </a:p>
+          <a:p>
+            <a:r>
+              <a:rPr lang="en-US" dirty="0"/>
+              <a:t>First we will briefly discuss the history and purpose of LINQ. </a:t>
+            </a:r>
+          </a:p>
+          <a:p>
+            <a:endParaRPr lang="en-US" dirty="0"/>
+          </a:p>
+          <a:p>
+            <a:r>
+              <a:rPr lang="en-US" dirty="0"/>
+              <a:t>Second we will look at the different syntaxes that LINQ could be written in, with briefly touching on some of the tradeoffs.</a:t>
+            </a:r>
+          </a:p>
+          <a:p>
+            <a:endParaRPr lang="en-US" dirty="0"/>
+          </a:p>
+          <a:p>
+            <a:r>
+              <a:rPr lang="en-US" dirty="0"/>
+              <a:t>Third, and the majority of our time, we will be looking at and running examples of the most common LINQ operators that we all should be familiar with. This includes operators that:</a:t>
+            </a:r>
+          </a:p>
+          <a:p>
+            <a:r>
+              <a:rPr lang="en-US" dirty="0"/>
+              <a:t>	- filter</a:t>
+            </a:r>
+          </a:p>
+          <a:p>
+            <a:r>
+              <a:rPr lang="en-US" dirty="0"/>
+              <a:t>	- order</a:t>
+            </a:r>
+          </a:p>
+          <a:p>
+            <a:r>
+              <a:rPr lang="en-US" dirty="0"/>
+              <a:t>	- quantify</a:t>
+            </a:r>
+          </a:p>
+          <a:p>
+            <a:r>
+              <a:rPr lang="en-US" dirty="0"/>
+              <a:t>	- group</a:t>
+            </a:r>
+          </a:p>
+          <a:p>
+            <a:r>
+              <a:rPr lang="en-US" dirty="0"/>
+              <a:t>	- project</a:t>
+            </a:r>
+          </a:p>
+          <a:p>
+            <a:r>
+              <a:rPr lang="en-US" dirty="0"/>
+              <a:t>	- flatten</a:t>
+            </a:r>
+          </a:p>
+          <a:p>
+            <a:endParaRPr lang="en-US" dirty="0"/>
+          </a:p>
+          <a:p>
+            <a:r>
+              <a:rPr lang="en-US" dirty="0"/>
+              <a:t>I’ll explain more on what these mean when we go through them. </a:t>
+            </a:r>
+          </a:p>
+          <a:p>
+            <a:endParaRPr lang="en-US" dirty="0"/>
+          </a:p>
+          <a:p>
+            <a:r>
+              <a:rPr lang="en-US" dirty="0"/>
+              <a:t>Fourth we will look at what’s called </a:t>
+            </a:r>
+            <a:r>
+              <a:rPr lang="en-US" i="1" dirty="0"/>
+              <a:t>Deferred Execution</a:t>
+            </a:r>
+            <a:r>
+              <a:rPr lang="en-US" i="0" dirty="0"/>
+              <a:t> and how it can affect your LINQ code.</a:t>
+            </a:r>
+          </a:p>
+          <a:p>
+            <a:endParaRPr lang="en-US" i="0" dirty="0"/>
+          </a:p>
+          <a:p>
+            <a:r>
+              <a:rPr lang="en-US" i="0" dirty="0"/>
+              <a:t>Finally, if we have time, I have a simple performance comparison of using LINQ versus not. </a:t>
+            </a:r>
+          </a:p>
+          <a:p>
+            <a:endParaRPr lang="en-US" i="0" dirty="0"/>
+          </a:p>
+          <a:p>
+            <a:r>
+              <a:rPr lang="en-US" i="0" dirty="0"/>
+              <a:t>Any questions before we go? Let’s go!</a:t>
+            </a:r>
+            <a:endParaRPr lang="en-US" dirty="0"/>
           </a:p>
         </p:txBody>
       </p:sp>
@@ -847,6 +972,163 @@
           <a:p>
             <a:fld id="{1112285D-B62D-0345-9A0E-5D91D31CA9B6}" type="slidenum">
               <a:rPr lang="en-US" smtClean="0"/>
+              <a:t>2</a:t>
+            </a:fld>
+            <a:endParaRPr lang="en-US"/>
+          </a:p>
+        </p:txBody>
+      </p:sp>
+    </p:spTree>
+    <p:extLst>
+      <p:ext uri="{BB962C8B-B14F-4D97-AF65-F5344CB8AC3E}">
+        <p14:creationId xmlns:p14="http://schemas.microsoft.com/office/powerpoint/2010/main" val="2009199861"/>
+      </p:ext>
+    </p:extLst>
+  </p:cSld>
+  <p:clrMapOvr>
+    <a:masterClrMapping/>
+  </p:clrMapOvr>
+</p:notes>
+</file>
+
+<file path=ppt/notesSlides/notesSlide3.xml><?xml version="1.0" encoding="utf-8"?>
+<p:notes xmlns:a="http://schemas.openxmlformats.org/drawingml/2006/main" xmlns:r="http://schemas.openxmlformats.org/officeDocument/2006/relationships" xmlns:p="http://schemas.openxmlformats.org/presentationml/2006/main">
+  <p:cSld>
+    <p:spTree>
+      <p:nvGrpSpPr>
+        <p:cNvPr id="1" name=""/>
+        <p:cNvGrpSpPr/>
+        <p:nvPr/>
+      </p:nvGrpSpPr>
+      <p:grpSpPr>
+        <a:xfrm>
+          <a:off x="0" y="0"/>
+          <a:ext cx="0" cy="0"/>
+          <a:chOff x="0" y="0"/>
+          <a:chExt cx="0" cy="0"/>
+        </a:xfrm>
+      </p:grpSpPr>
+      <p:sp>
+        <p:nvSpPr>
+          <p:cNvPr id="2" name="Slide Image Placeholder 1"/>
+          <p:cNvSpPr>
+            <a:spLocks noGrp="1" noRot="1" noChangeAspect="1"/>
+          </p:cNvSpPr>
+          <p:nvPr>
+            <p:ph type="sldImg"/>
+          </p:nvPr>
+        </p:nvSpPr>
+        <p:spPr/>
+      </p:sp>
+      <p:sp>
+        <p:nvSpPr>
+          <p:cNvPr id="3" name="Notes Placeholder 2"/>
+          <p:cNvSpPr>
+            <a:spLocks noGrp="1"/>
+          </p:cNvSpPr>
+          <p:nvPr>
+            <p:ph type="body" idx="1"/>
+          </p:nvPr>
+        </p:nvSpPr>
+        <p:spPr/>
+        <p:txBody>
+          <a:bodyPr/>
+          <a:lstStyle/>
+          <a:p>
+            <a:r>
+              <a:rPr lang="en-US" dirty="0"/>
+              <a:t>So LINQ. LINQ stand for Language Integrated Query, and how it came about is a simple story really. </a:t>
+            </a:r>
+          </a:p>
+          <a:p>
+            <a:endParaRPr lang="en-US" dirty="0"/>
+          </a:p>
+          <a:p>
+            <a:r>
+              <a:rPr lang="en-US" dirty="0"/>
+              <a:t>Back in the early days of </a:t>
+            </a:r>
+            <a:r>
+              <a:rPr lang="en-US" dirty="0" err="1"/>
+              <a:t>.Net</a:t>
+            </a:r>
+            <a:r>
+              <a:rPr lang="en-US" dirty="0"/>
+              <a:t>, if you wanted to interact with data, how you did so varied widely by the type of data.</a:t>
+            </a:r>
+          </a:p>
+          <a:p>
+            <a:endParaRPr lang="en-US" dirty="0"/>
+          </a:p>
+          <a:p>
+            <a:r>
+              <a:rPr lang="en-US" dirty="0"/>
+              <a:t>If you wanted to query data in a relational database, there were established </a:t>
+            </a:r>
+            <a:r>
+              <a:rPr lang="en-US" dirty="0" err="1"/>
+              <a:t>.Net</a:t>
+            </a:r>
+            <a:r>
+              <a:rPr lang="en-US" dirty="0"/>
+              <a:t> libraries to do that. </a:t>
+            </a:r>
+          </a:p>
+          <a:p>
+            <a:endParaRPr lang="en-US" dirty="0"/>
+          </a:p>
+          <a:p>
+            <a:r>
+              <a:rPr lang="en-US" dirty="0"/>
+              <a:t>If you wanted to work with in memory data, that was done in a different way.</a:t>
+            </a:r>
+          </a:p>
+          <a:p>
+            <a:endParaRPr lang="en-US" dirty="0"/>
+          </a:p>
+          <a:p>
+            <a:r>
+              <a:rPr lang="en-US" dirty="0"/>
+              <a:t>Or if you wanted to query another data source like an XML file (XML was BIG back then…) there was yet another set of APIs to do so. </a:t>
+            </a:r>
+          </a:p>
+          <a:p>
+            <a:endParaRPr lang="en-US" dirty="0"/>
+          </a:p>
+          <a:p>
+            <a:r>
+              <a:rPr lang="en-US" dirty="0"/>
+              <a:t>Microsoft wanted a unified syntax and feature set, as features varied some and syntax varied a lot.</a:t>
+            </a:r>
+          </a:p>
+          <a:p>
+            <a:endParaRPr lang="en-US" dirty="0"/>
+          </a:p>
+          <a:p>
+            <a:r>
+              <a:rPr lang="en-US" dirty="0"/>
+              <a:t>And so, LINQ was born! </a:t>
+            </a:r>
+          </a:p>
+        </p:txBody>
+      </p:sp>
+      <p:sp>
+        <p:nvSpPr>
+          <p:cNvPr id="4" name="Slide Number Placeholder 3"/>
+          <p:cNvSpPr>
+            <a:spLocks noGrp="1"/>
+          </p:cNvSpPr>
+          <p:nvPr>
+            <p:ph type="sldNum" sz="quarter" idx="5"/>
+          </p:nvPr>
+        </p:nvSpPr>
+        <p:spPr/>
+        <p:txBody>
+          <a:bodyPr/>
+          <a:lstStyle/>
+          <a:p>
+            <a:fld id="{1112285D-B62D-0345-9A0E-5D91D31CA9B6}" type="slidenum">
+              <a:rPr lang="en-US" smtClean="0"/>
               <a:t>3</a:t>
             </a:fld>
             <a:endParaRPr lang="en-US"/>
@@ -857,6 +1139,213 @@
     <p:extLst>
       <p:ext uri="{BB962C8B-B14F-4D97-AF65-F5344CB8AC3E}">
         <p14:creationId xmlns:p14="http://schemas.microsoft.com/office/powerpoint/2010/main" val="1788624831"/>
+      </p:ext>
+    </p:extLst>
+  </p:cSld>
+  <p:clrMapOvr>
+    <a:masterClrMapping/>
+  </p:clrMapOvr>
+</p:notes>
+</file>
+
+<file path=ppt/notesSlides/notesSlide4.xml><?xml version="1.0" encoding="utf-8"?>
+<p:notes xmlns:a="http://schemas.openxmlformats.org/drawingml/2006/main" xmlns:r="http://schemas.openxmlformats.org/officeDocument/2006/relationships" xmlns:p="http://schemas.openxmlformats.org/presentationml/2006/main">
+  <p:cSld>
+    <p:spTree>
+      <p:nvGrpSpPr>
+        <p:cNvPr id="1" name=""/>
+        <p:cNvGrpSpPr/>
+        <p:nvPr/>
+      </p:nvGrpSpPr>
+      <p:grpSpPr>
+        <a:xfrm>
+          <a:off x="0" y="0"/>
+          <a:ext cx="0" cy="0"/>
+          <a:chOff x="0" y="0"/>
+          <a:chExt cx="0" cy="0"/>
+        </a:xfrm>
+      </p:grpSpPr>
+      <p:sp>
+        <p:nvSpPr>
+          <p:cNvPr id="2" name="Slide Image Placeholder 1"/>
+          <p:cNvSpPr>
+            <a:spLocks noGrp="1" noRot="1" noChangeAspect="1"/>
+          </p:cNvSpPr>
+          <p:nvPr>
+            <p:ph type="sldImg"/>
+          </p:nvPr>
+        </p:nvSpPr>
+        <p:spPr/>
+      </p:sp>
+      <p:sp>
+        <p:nvSpPr>
+          <p:cNvPr id="3" name="Notes Placeholder 2"/>
+          <p:cNvSpPr>
+            <a:spLocks noGrp="1"/>
+          </p:cNvSpPr>
+          <p:nvPr>
+            <p:ph type="body" idx="1"/>
+          </p:nvPr>
+        </p:nvSpPr>
+        <p:spPr/>
+        <p:txBody>
+          <a:bodyPr/>
+          <a:lstStyle/>
+          <a:p>
+            <a:r>
+              <a:rPr lang="en-US" dirty="0"/>
+              <a:t>Let’s take a look at the two syntaxes that you can compose LINQ in. </a:t>
+            </a:r>
+          </a:p>
+          <a:p>
+            <a:endParaRPr lang="en-US" dirty="0"/>
+          </a:p>
+          <a:p>
+            <a:r>
+              <a:rPr lang="en-US" dirty="0"/>
+              <a:t>You can compose LINQ in one syntax referred to as </a:t>
+            </a:r>
+            <a:r>
+              <a:rPr lang="en-US" i="1" dirty="0"/>
+              <a:t>Query Syntax</a:t>
+            </a:r>
+            <a:r>
+              <a:rPr lang="en-US" i="0" dirty="0"/>
+              <a:t>.</a:t>
+            </a:r>
+          </a:p>
+          <a:p>
+            <a:endParaRPr lang="en-US" i="0" dirty="0"/>
+          </a:p>
+          <a:p>
+            <a:r>
+              <a:rPr lang="en-US" i="0" dirty="0"/>
+              <a:t>This looks and reads much like SQL or other relational database querying languages, but with a few differences. </a:t>
+            </a:r>
+          </a:p>
+          <a:p>
+            <a:r>
+              <a:rPr lang="en-US" i="0" dirty="0"/>
+              <a:t>(For example the </a:t>
+            </a:r>
+            <a:r>
+              <a:rPr lang="en-US" i="1" dirty="0"/>
+              <a:t>Select </a:t>
+            </a:r>
+            <a:r>
+              <a:rPr lang="en-US" i="0" dirty="0"/>
+              <a:t>always comes last)</a:t>
+            </a:r>
+          </a:p>
+          <a:p>
+            <a:endParaRPr lang="en-US" i="0" dirty="0"/>
+          </a:p>
+          <a:p>
+            <a:r>
+              <a:rPr lang="en-US" i="0" dirty="0"/>
+              <a:t>The second syntax is known as </a:t>
+            </a:r>
+            <a:r>
+              <a:rPr lang="en-US" i="1" dirty="0"/>
+              <a:t>Method Syntax</a:t>
+            </a:r>
+            <a:r>
+              <a:rPr lang="en-US" i="0" dirty="0"/>
+              <a:t>. This takes the form of chained method calls. </a:t>
+            </a:r>
+          </a:p>
+          <a:p>
+            <a:endParaRPr lang="en-US" i="0" dirty="0"/>
+          </a:p>
+          <a:p>
+            <a:r>
+              <a:rPr lang="en-US" i="0" dirty="0"/>
+              <a:t>Generally speaking, these to syntaxes are SEMANTICALLY IDENTICAL. But…</a:t>
+            </a:r>
+          </a:p>
+          <a:p>
+            <a:endParaRPr lang="en-US" i="0" dirty="0"/>
+          </a:p>
+          <a:p>
+            <a:r>
+              <a:rPr lang="en-US" i="0" dirty="0"/>
+              <a:t>Query Syntax can’t quite do </a:t>
+            </a:r>
+            <a:r>
+              <a:rPr lang="en-US" i="1" dirty="0"/>
+              <a:t>ALL </a:t>
+            </a:r>
+            <a:r>
+              <a:rPr lang="en-US" i="0" dirty="0"/>
+              <a:t>the operators Method Syntax can, </a:t>
+            </a:r>
+          </a:p>
+          <a:p>
+            <a:endParaRPr lang="en-US" i="0" dirty="0"/>
+          </a:p>
+          <a:p>
+            <a:r>
+              <a:rPr lang="en-US" i="0" dirty="0"/>
+              <a:t>And Method Syntax is faster, </a:t>
+            </a:r>
+          </a:p>
+          <a:p>
+            <a:endParaRPr lang="en-US" i="0" dirty="0"/>
+          </a:p>
+          <a:p>
+            <a:r>
+              <a:rPr lang="en-US" i="0" dirty="0"/>
+              <a:t>And simpler to write,</a:t>
+            </a:r>
+          </a:p>
+          <a:p>
+            <a:endParaRPr lang="en-US" i="0" dirty="0"/>
+          </a:p>
+          <a:p>
+            <a:r>
+              <a:rPr lang="en-US" i="0" dirty="0"/>
+              <a:t>And just better, </a:t>
+            </a:r>
+          </a:p>
+          <a:p>
+            <a:endParaRPr lang="en-US" i="0" dirty="0"/>
+          </a:p>
+          <a:p>
+            <a:r>
+              <a:rPr lang="en-US" i="0" dirty="0"/>
+              <a:t>But we digress, both syntaxes are “ valid “. For this presentation though, I will be showing code almost exclusively in Method Syntax. </a:t>
+            </a:r>
+            <a:endParaRPr lang="en-US" dirty="0"/>
+          </a:p>
+        </p:txBody>
+      </p:sp>
+      <p:sp>
+        <p:nvSpPr>
+          <p:cNvPr id="4" name="Slide Number Placeholder 3"/>
+          <p:cNvSpPr>
+            <a:spLocks noGrp="1"/>
+          </p:cNvSpPr>
+          <p:nvPr>
+            <p:ph type="sldNum" sz="quarter" idx="5"/>
+          </p:nvPr>
+        </p:nvSpPr>
+        <p:spPr/>
+        <p:txBody>
+          <a:bodyPr/>
+          <a:lstStyle/>
+          <a:p>
+            <a:fld id="{1112285D-B62D-0345-9A0E-5D91D31CA9B6}" type="slidenum">
+              <a:rPr lang="en-US" smtClean="0"/>
+              <a:t>4</a:t>
+            </a:fld>
+            <a:endParaRPr lang="en-US"/>
+          </a:p>
+        </p:txBody>
+      </p:sp>
+    </p:spTree>
+    <p:extLst>
+      <p:ext uri="{BB962C8B-B14F-4D97-AF65-F5344CB8AC3E}">
+        <p14:creationId xmlns:p14="http://schemas.microsoft.com/office/powerpoint/2010/main" val="2351649588"/>
       </p:ext>
     </p:extLst>
   </p:cSld>
@@ -25190,8 +25679,8 @@
         </p:nvSpPr>
         <p:spPr>
           <a:xfrm>
-            <a:off x="4107795" y="1171073"/>
-            <a:ext cx="3976410" cy="400110"/>
+            <a:off x="4521231" y="1162792"/>
+            <a:ext cx="3149534" cy="400110"/>
           </a:xfrm>
           <a:prstGeom prst="rect">
             <a:avLst/>
@@ -25199,7 +25688,7 @@
           <a:noFill/>
         </p:spPr>
         <p:txBody>
-          <a:bodyPr wrap="none" rtlCol="0">
+          <a:bodyPr wrap="square" rtlCol="0">
             <a:spAutoFit/>
           </a:bodyPr>
           <a:lstStyle/>
@@ -25971,7 +26460,7 @@
           <p:nvPr/>
         </p:nvPicPr>
         <p:blipFill>
-          <a:blip r:embed="rId2"/>
+          <a:blip r:embed="rId3"/>
           <a:stretch>
             <a:fillRect/>
           </a:stretch>
@@ -26001,7 +26490,7 @@
           <p:nvPr/>
         </p:nvPicPr>
         <p:blipFill>
-          <a:blip r:embed="rId3"/>
+          <a:blip r:embed="rId4"/>
           <a:stretch>
             <a:fillRect/>
           </a:stretch>

</xml_diff>

<commit_message>
Add data slide and final format of program.cs
</commit_message>
<xml_diff>
--- a/Slides.pptx
+++ b/Slides.pptx
@@ -5,17 +5,18 @@
     <p:sldMasterId id="2147483649" r:id="rId1"/>
   </p:sldMasterIdLst>
   <p:notesMasterIdLst>
-    <p:notesMasterId r:id="rId7"/>
+    <p:notesMasterId r:id="rId8"/>
   </p:notesMasterIdLst>
   <p:handoutMasterIdLst>
-    <p:handoutMasterId r:id="rId8"/>
+    <p:handoutMasterId r:id="rId9"/>
   </p:handoutMasterIdLst>
   <p:sldIdLst>
     <p:sldId id="267" r:id="rId2"/>
     <p:sldId id="270" r:id="rId3"/>
     <p:sldId id="272" r:id="rId4"/>
     <p:sldId id="273" r:id="rId5"/>
-    <p:sldId id="271" r:id="rId6"/>
+    <p:sldId id="274" r:id="rId6"/>
+    <p:sldId id="271" r:id="rId7"/>
   </p:sldIdLst>
   <p:sldSz cx="12192000" cy="6858000"/>
   <p:notesSz cx="6858000" cy="9144000"/>
@@ -1346,6 +1347,130 @@
     <p:extLst>
       <p:ext uri="{BB962C8B-B14F-4D97-AF65-F5344CB8AC3E}">
         <p14:creationId xmlns:p14="http://schemas.microsoft.com/office/powerpoint/2010/main" val="2351649588"/>
+      </p:ext>
+    </p:extLst>
+  </p:cSld>
+  <p:clrMapOvr>
+    <a:masterClrMapping/>
+  </p:clrMapOvr>
+</p:notes>
+</file>
+
+<file path=ppt/notesSlides/notesSlide5.xml><?xml version="1.0" encoding="utf-8"?>
+<p:notes xmlns:a="http://schemas.openxmlformats.org/drawingml/2006/main" xmlns:r="http://schemas.openxmlformats.org/officeDocument/2006/relationships" xmlns:p="http://schemas.openxmlformats.org/presentationml/2006/main">
+  <p:cSld>
+    <p:spTree>
+      <p:nvGrpSpPr>
+        <p:cNvPr id="1" name=""/>
+        <p:cNvGrpSpPr/>
+        <p:nvPr/>
+      </p:nvGrpSpPr>
+      <p:grpSpPr>
+        <a:xfrm>
+          <a:off x="0" y="0"/>
+          <a:ext cx="0" cy="0"/>
+          <a:chOff x="0" y="0"/>
+          <a:chExt cx="0" cy="0"/>
+        </a:xfrm>
+      </p:grpSpPr>
+      <p:sp>
+        <p:nvSpPr>
+          <p:cNvPr id="2" name="Slide Image Placeholder 1"/>
+          <p:cNvSpPr>
+            <a:spLocks noGrp="1" noRot="1" noChangeAspect="1"/>
+          </p:cNvSpPr>
+          <p:nvPr>
+            <p:ph type="sldImg"/>
+          </p:nvPr>
+        </p:nvSpPr>
+        <p:spPr/>
+      </p:sp>
+      <p:sp>
+        <p:nvSpPr>
+          <p:cNvPr id="3" name="Notes Placeholder 2"/>
+          <p:cNvSpPr>
+            <a:spLocks noGrp="1"/>
+          </p:cNvSpPr>
+          <p:nvPr>
+            <p:ph type="body" idx="1"/>
+          </p:nvPr>
+        </p:nvSpPr>
+        <p:spPr/>
+        <p:txBody>
+          <a:bodyPr/>
+          <a:lstStyle/>
+          <a:p>
+            <a:r>
+              <a:rPr lang="en-US" dirty="0"/>
+              <a:t>Before we jump into code, let’s take a quick look at the data we will be using. </a:t>
+            </a:r>
+          </a:p>
+          <a:p>
+            <a:endParaRPr lang="en-US" dirty="0"/>
+          </a:p>
+          <a:p>
+            <a:endParaRPr lang="en-US" dirty="0"/>
+          </a:p>
+          <a:p>
+            <a:r>
+              <a:rPr lang="en-US" dirty="0"/>
+              <a:t>VOLCANOES!!!</a:t>
+            </a:r>
+          </a:p>
+          <a:p>
+            <a:r>
+              <a:rPr lang="en-US" dirty="0"/>
+              <a:t>(yes that’s a real eruption of a volcano in Chile)</a:t>
+            </a:r>
+          </a:p>
+          <a:p>
+            <a:endParaRPr lang="en-US" dirty="0"/>
+          </a:p>
+          <a:p>
+            <a:r>
+              <a:rPr lang="en-US" dirty="0"/>
+              <a:t>We’ll be using a data set I retrieved from the Smithsonian. The data is a csv of ~1,400 rows containing fields like type, country, last eruption year, rocks, etc. </a:t>
+            </a:r>
+          </a:p>
+          <a:p>
+            <a:endParaRPr lang="en-US" dirty="0"/>
+          </a:p>
+          <a:p>
+            <a:r>
+              <a:rPr lang="en-US"/>
+              <a:t>Let’s go code!</a:t>
+            </a:r>
+            <a:endParaRPr lang="en-US" dirty="0"/>
+          </a:p>
+        </p:txBody>
+      </p:sp>
+      <p:sp>
+        <p:nvSpPr>
+          <p:cNvPr id="4" name="Slide Number Placeholder 3"/>
+          <p:cNvSpPr>
+            <a:spLocks noGrp="1"/>
+          </p:cNvSpPr>
+          <p:nvPr>
+            <p:ph type="sldNum" sz="quarter" idx="5"/>
+          </p:nvPr>
+        </p:nvSpPr>
+        <p:spPr/>
+        <p:txBody>
+          <a:bodyPr/>
+          <a:lstStyle/>
+          <a:p>
+            <a:fld id="{1112285D-B62D-0345-9A0E-5D91D31CA9B6}" type="slidenum">
+              <a:rPr lang="en-US" smtClean="0"/>
+              <a:t>5</a:t>
+            </a:fld>
+            <a:endParaRPr lang="en-US"/>
+          </a:p>
+        </p:txBody>
+      </p:sp>
+    </p:spTree>
+    <p:extLst>
+      <p:ext uri="{BB962C8B-B14F-4D97-AF65-F5344CB8AC3E}">
+        <p14:creationId xmlns:p14="http://schemas.microsoft.com/office/powerpoint/2010/main" val="4012580650"/>
       </p:ext>
     </p:extLst>
   </p:cSld>
@@ -27237,6 +27362,277 @@
 </file>
 
 <file path=ppt/slides/slide5.xml><?xml version="1.0" encoding="utf-8"?>
+<p:sld xmlns:a="http://schemas.openxmlformats.org/drawingml/2006/main" xmlns:r="http://schemas.openxmlformats.org/officeDocument/2006/relationships" xmlns:p="http://schemas.openxmlformats.org/presentationml/2006/main">
+  <p:cSld>
+    <p:spTree>
+      <p:nvGrpSpPr>
+        <p:cNvPr id="1" name=""/>
+        <p:cNvGrpSpPr/>
+        <p:nvPr/>
+      </p:nvGrpSpPr>
+      <p:grpSpPr>
+        <a:xfrm>
+          <a:off x="0" y="0"/>
+          <a:ext cx="0" cy="0"/>
+          <a:chOff x="0" y="0"/>
+          <a:chExt cx="0" cy="0"/>
+        </a:xfrm>
+      </p:grpSpPr>
+      <p:sp>
+        <p:nvSpPr>
+          <p:cNvPr id="2" name="Title 1">
+            <a:extLst>
+              <a:ext uri="{FF2B5EF4-FFF2-40B4-BE49-F238E27FC236}">
+                <a16:creationId xmlns:a16="http://schemas.microsoft.com/office/drawing/2014/main" id="{C56DAED9-B3F1-4C6A-B4D4-752FF1742F59}"/>
+              </a:ext>
+            </a:extLst>
+          </p:cNvPr>
+          <p:cNvSpPr>
+            <a:spLocks noGrp="1"/>
+          </p:cNvSpPr>
+          <p:nvPr>
+            <p:ph type="title"/>
+          </p:nvPr>
+        </p:nvSpPr>
+        <p:spPr/>
+        <p:txBody>
+          <a:bodyPr/>
+          <a:lstStyle/>
+          <a:p>
+            <a:r>
+              <a:rPr lang="en-US" dirty="0"/>
+              <a:t>The Data We Will Work With</a:t>
+            </a:r>
+          </a:p>
+        </p:txBody>
+      </p:sp>
+      <p:pic>
+        <p:nvPicPr>
+          <p:cNvPr id="1026" name="Picture 2" descr="https://science.sciencemag.org/content/sci/355/6331/eaag3055/F1.large.jpg?width=800&amp;height=600&amp;carousel=1">
+            <a:extLst>
+              <a:ext uri="{FF2B5EF4-FFF2-40B4-BE49-F238E27FC236}">
+                <a16:creationId xmlns:a16="http://schemas.microsoft.com/office/drawing/2014/main" id="{A15BB602-33BE-4DC3-AFFB-92A55F8CF1F4}"/>
+              </a:ext>
+            </a:extLst>
+          </p:cNvPr>
+          <p:cNvPicPr>
+            <a:picLocks noChangeAspect="1" noChangeArrowheads="1"/>
+          </p:cNvPicPr>
+          <p:nvPr/>
+        </p:nvPicPr>
+        <p:blipFill>
+          <a:blip r:embed="rId3" cstate="print">
+            <a:extLst>
+              <a:ext uri="{28A0092B-C50C-407E-A947-70E740481C1C}">
+                <a14:useLocalDpi xmlns:a14="http://schemas.microsoft.com/office/drawing/2010/main" val="0"/>
+              </a:ext>
+            </a:extLst>
+          </a:blip>
+          <a:srcRect/>
+          <a:stretch>
+            <a:fillRect/>
+          </a:stretch>
+        </p:blipFill>
+        <p:spPr bwMode="auto">
+          <a:xfrm>
+            <a:off x="4075856" y="1172672"/>
+            <a:ext cx="4040288" cy="4203768"/>
+          </a:xfrm>
+          <a:prstGeom prst="rect">
+            <a:avLst/>
+          </a:prstGeom>
+          <a:noFill/>
+          <a:extLst>
+            <a:ext uri="{909E8E84-426E-40DD-AFC4-6F175D3DCCD1}">
+              <a14:hiddenFill xmlns:a14="http://schemas.microsoft.com/office/drawing/2010/main">
+                <a:solidFill>
+                  <a:srgbClr val="FFFFFF"/>
+                </a:solidFill>
+              </a14:hiddenFill>
+            </a:ext>
+          </a:extLst>
+        </p:spPr>
+      </p:pic>
+      <p:pic>
+        <p:nvPicPr>
+          <p:cNvPr id="3" name="Picture 2">
+            <a:extLst>
+              <a:ext uri="{FF2B5EF4-FFF2-40B4-BE49-F238E27FC236}">
+                <a16:creationId xmlns:a16="http://schemas.microsoft.com/office/drawing/2014/main" id="{A8D00193-2B74-4C93-9F7E-48E909932358}"/>
+              </a:ext>
+            </a:extLst>
+          </p:cNvPr>
+          <p:cNvPicPr>
+            <a:picLocks noChangeAspect="1"/>
+          </p:cNvPicPr>
+          <p:nvPr/>
+        </p:nvPicPr>
+        <p:blipFill>
+          <a:blip r:embed="rId4"/>
+          <a:stretch>
+            <a:fillRect/>
+          </a:stretch>
+        </p:blipFill>
+        <p:spPr>
+          <a:xfrm>
+            <a:off x="852668" y="5523590"/>
+            <a:ext cx="10486663" cy="1041831"/>
+          </a:xfrm>
+          <a:prstGeom prst="rect">
+            <a:avLst/>
+          </a:prstGeom>
+        </p:spPr>
+      </p:pic>
+    </p:spTree>
+    <p:extLst>
+      <p:ext uri="{BB962C8B-B14F-4D97-AF65-F5344CB8AC3E}">
+        <p14:creationId xmlns:p14="http://schemas.microsoft.com/office/powerpoint/2010/main" val="3254193961"/>
+      </p:ext>
+    </p:extLst>
+  </p:cSld>
+  <p:clrMapOvr>
+    <a:masterClrMapping/>
+  </p:clrMapOvr>
+  <p:timing>
+    <p:tnLst>
+      <p:par>
+        <p:cTn id="1" dur="indefinite" restart="never" nodeType="tmRoot">
+          <p:childTnLst>
+            <p:seq concurrent="1" nextAc="seek">
+              <p:cTn id="2" dur="indefinite" nodeType="mainSeq">
+                <p:childTnLst>
+                  <p:par>
+                    <p:cTn id="3" fill="hold">
+                      <p:stCondLst>
+                        <p:cond delay="indefinite"/>
+                      </p:stCondLst>
+                      <p:childTnLst>
+                        <p:par>
+                          <p:cTn id="4" fill="hold">
+                            <p:stCondLst>
+                              <p:cond delay="0"/>
+                            </p:stCondLst>
+                            <p:childTnLst>
+                              <p:par>
+                                <p:cTn id="5" presetID="10" presetClass="entr" presetSubtype="0" fill="hold" nodeType="clickEffect">
+                                  <p:stCondLst>
+                                    <p:cond delay="0"/>
+                                  </p:stCondLst>
+                                  <p:childTnLst>
+                                    <p:set>
+                                      <p:cBhvr>
+                                        <p:cTn id="6" dur="1" fill="hold">
+                                          <p:stCondLst>
+                                            <p:cond delay="0"/>
+                                          </p:stCondLst>
+                                        </p:cTn>
+                                        <p:tgtEl>
+                                          <p:spTgt spid="1026"/>
+                                        </p:tgtEl>
+                                        <p:attrNameLst>
+                                          <p:attrName>style.visibility</p:attrName>
+                                        </p:attrNameLst>
+                                      </p:cBhvr>
+                                      <p:to>
+                                        <p:strVal val="visible"/>
+                                      </p:to>
+                                    </p:set>
+                                    <p:animEffect transition="in" filter="fade">
+                                      <p:cBhvr>
+                                        <p:cTn id="7" dur="500"/>
+                                        <p:tgtEl>
+                                          <p:spTgt spid="1026"/>
+                                        </p:tgtEl>
+                                      </p:cBhvr>
+                                    </p:animEffect>
+                                  </p:childTnLst>
+                                </p:cTn>
+                              </p:par>
+                            </p:childTnLst>
+                          </p:cTn>
+                        </p:par>
+                      </p:childTnLst>
+                    </p:cTn>
+                  </p:par>
+                  <p:par>
+                    <p:cTn id="8" fill="hold">
+                      <p:stCondLst>
+                        <p:cond delay="indefinite"/>
+                      </p:stCondLst>
+                      <p:childTnLst>
+                        <p:par>
+                          <p:cTn id="9" fill="hold">
+                            <p:stCondLst>
+                              <p:cond delay="0"/>
+                            </p:stCondLst>
+                            <p:childTnLst>
+                              <p:par>
+                                <p:cTn id="10" presetID="10" presetClass="entr" presetSubtype="0" fill="hold" nodeType="clickEffect">
+                                  <p:stCondLst>
+                                    <p:cond delay="0"/>
+                                  </p:stCondLst>
+                                  <p:childTnLst>
+                                    <p:set>
+                                      <p:cBhvr>
+                                        <p:cTn id="11" dur="1" fill="hold">
+                                          <p:stCondLst>
+                                            <p:cond delay="0"/>
+                                          </p:stCondLst>
+                                        </p:cTn>
+                                        <p:tgtEl>
+                                          <p:spTgt spid="3"/>
+                                        </p:tgtEl>
+                                        <p:attrNameLst>
+                                          <p:attrName>style.visibility</p:attrName>
+                                        </p:attrNameLst>
+                                      </p:cBhvr>
+                                      <p:to>
+                                        <p:strVal val="visible"/>
+                                      </p:to>
+                                    </p:set>
+                                    <p:animEffect transition="in" filter="fade">
+                                      <p:cBhvr>
+                                        <p:cTn id="12" dur="500"/>
+                                        <p:tgtEl>
+                                          <p:spTgt spid="3"/>
+                                        </p:tgtEl>
+                                      </p:cBhvr>
+                                    </p:animEffect>
+                                  </p:childTnLst>
+                                </p:cTn>
+                              </p:par>
+                            </p:childTnLst>
+                          </p:cTn>
+                        </p:par>
+                      </p:childTnLst>
+                    </p:cTn>
+                  </p:par>
+                </p:childTnLst>
+              </p:cTn>
+              <p:prevCondLst>
+                <p:cond evt="onPrev" delay="0">
+                  <p:tgtEl>
+                    <p:sldTgt/>
+                  </p:tgtEl>
+                </p:cond>
+              </p:prevCondLst>
+              <p:nextCondLst>
+                <p:cond evt="onNext" delay="0">
+                  <p:tgtEl>
+                    <p:sldTgt/>
+                  </p:tgtEl>
+                </p:cond>
+              </p:nextCondLst>
+            </p:seq>
+          </p:childTnLst>
+        </p:cTn>
+      </p:par>
+    </p:tnLst>
+  </p:timing>
+</p:sld>
+</file>
+
+<file path=ppt/slides/slide6.xml><?xml version="1.0" encoding="utf-8"?>
 <p:sld xmlns:a="http://schemas.openxmlformats.org/drawingml/2006/main" xmlns:r="http://schemas.openxmlformats.org/officeDocument/2006/relationships" xmlns:p="http://schemas.openxmlformats.org/presentationml/2006/main" showMasterPhAnim="0">
   <p:cSld>
     <p:spTree>

</xml_diff>

<commit_message>
small tweak to slides
</commit_message>
<xml_diff>
--- a/Slides.pptx
+++ b/Slides.pptx
@@ -1437,10 +1437,9 @@
           </a:p>
           <a:p>
             <a:r>
-              <a:rPr lang="en-US"/>
+              <a:rPr lang="en-US" dirty="0"/>
               <a:t>Let’s go code!</a:t>
             </a:r>
-            <a:endParaRPr lang="en-US" dirty="0"/>
           </a:p>
         </p:txBody>
       </p:sp>
@@ -26644,8 +26643,8 @@
         </p:nvSpPr>
         <p:spPr>
           <a:xfrm>
-            <a:off x="4730081" y="4042049"/>
-            <a:ext cx="2731838" cy="369332"/>
+            <a:off x="4965486" y="4041377"/>
+            <a:ext cx="2261028" cy="369332"/>
           </a:xfrm>
           <a:prstGeom prst="rect">
             <a:avLst/>
@@ -26653,7 +26652,7 @@
           <a:noFill/>
         </p:spPr>
         <p:txBody>
-          <a:bodyPr wrap="none" rtlCol="0">
+          <a:bodyPr wrap="square" rtlCol="0">
             <a:spAutoFit/>
           </a:bodyPr>
           <a:lstStyle/>
@@ -26680,8 +26679,8 @@
         </p:nvSpPr>
         <p:spPr>
           <a:xfrm>
-            <a:off x="5683867" y="4313003"/>
-            <a:ext cx="758541" cy="369332"/>
+            <a:off x="5760683" y="4317949"/>
+            <a:ext cx="670634" cy="369332"/>
           </a:xfrm>
           <a:prstGeom prst="rect">
             <a:avLst/>
@@ -26689,7 +26688,7 @@
           <a:noFill/>
         </p:spPr>
         <p:txBody>
-          <a:bodyPr wrap="none" rtlCol="0">
+          <a:bodyPr wrap="square" rtlCol="0">
             <a:spAutoFit/>
           </a:bodyPr>
           <a:lstStyle/>
@@ -26715,8 +26714,8 @@
         </p:nvSpPr>
         <p:spPr>
           <a:xfrm>
-            <a:off x="2123629" y="5024735"/>
-            <a:ext cx="7879016" cy="461665"/>
+            <a:off x="2921480" y="5024735"/>
+            <a:ext cx="6349039" cy="461665"/>
           </a:xfrm>
           <a:prstGeom prst="rect">
             <a:avLst/>
@@ -26724,7 +26723,7 @@
           <a:noFill/>
         </p:spPr>
         <p:txBody>
-          <a:bodyPr wrap="none" rtlCol="0">
+          <a:bodyPr wrap="square" rtlCol="0">
             <a:spAutoFit/>
           </a:bodyPr>
           <a:lstStyle/>
@@ -26750,8 +26749,8 @@
         </p:nvSpPr>
         <p:spPr>
           <a:xfrm>
-            <a:off x="4691000" y="5486400"/>
-            <a:ext cx="2810000" cy="307777"/>
+            <a:off x="4913081" y="5485300"/>
+            <a:ext cx="2300109" cy="307777"/>
           </a:xfrm>
           <a:prstGeom prst="rect">
             <a:avLst/>
@@ -26759,7 +26758,7 @@
           <a:noFill/>
         </p:spPr>
         <p:txBody>
-          <a:bodyPr wrap="none" rtlCol="0">
+          <a:bodyPr wrap="square" rtlCol="0">
             <a:spAutoFit/>
           </a:bodyPr>
           <a:lstStyle/>
@@ -26785,8 +26784,8 @@
         </p:nvSpPr>
         <p:spPr>
           <a:xfrm>
-            <a:off x="5244547" y="6097554"/>
-            <a:ext cx="1637179" cy="307777"/>
+            <a:off x="5369261" y="6099753"/>
+            <a:ext cx="1387747" cy="307777"/>
           </a:xfrm>
           <a:prstGeom prst="rect">
             <a:avLst/>
@@ -26794,7 +26793,7 @@
           <a:noFill/>
         </p:spPr>
         <p:txBody>
-          <a:bodyPr wrap="none" rtlCol="0">
+          <a:bodyPr wrap="square" rtlCol="0">
             <a:spAutoFit/>
           </a:bodyPr>
           <a:lstStyle/>
@@ -26820,8 +26819,8 @@
         </p:nvSpPr>
         <p:spPr>
           <a:xfrm>
-            <a:off x="4993357" y="5791977"/>
-            <a:ext cx="2139560" cy="307777"/>
+            <a:off x="5207082" y="5793076"/>
+            <a:ext cx="1777833" cy="307777"/>
           </a:xfrm>
           <a:prstGeom prst="rect">
             <a:avLst/>
@@ -26829,7 +26828,7 @@
           <a:noFill/>
         </p:spPr>
         <p:txBody>
-          <a:bodyPr wrap="none" rtlCol="0">
+          <a:bodyPr wrap="square" rtlCol="0">
             <a:spAutoFit/>
           </a:bodyPr>
           <a:lstStyle/>

</xml_diff>